<commit_message>
Added link for our GitHub repository
</commit_message>
<xml_diff>
--- a/SAP with AngularJS.pptx
+++ b/SAP with AngularJS.pptx
@@ -268,7 +268,7 @@
               <a:rPr lang="de-DE" smtClean="0">
                 <a:latin typeface="AA Zuehlke" pitchFamily="2" charset="0"/>
               </a:rPr>
-              <a:t>13.10.2015</a:t>
+              <a:t>15.10.2015</a:t>
             </a:fld>
             <a:endParaRPr lang="de-DE">
               <a:latin typeface="AA Zuehlke" pitchFamily="2" charset="0"/>
@@ -446,7 +446,7 @@
             <a:fld id="{A6966AE6-B72D-4967-9CA3-8469D2863705}" type="datetimeFigureOut">
               <a:rPr lang="en-US" smtClean="0"/>
               <a:pPr/>
-              <a:t>10/13/2015</a:t>
+              <a:t>10/15/2015</a:t>
             </a:fld>
             <a:endParaRPr lang="en-US" dirty="0"/>
           </a:p>
@@ -5775,7 +5775,6 @@
               <a:rPr lang="en-GB" b="1" dirty="0" smtClean="0"/>
               <a:t>AngularJS</a:t>
             </a:r>
-            <a:endParaRPr lang="en-GB" b="1" dirty="0" smtClean="0"/>
           </a:p>
           <a:p>
             <a:pPr marL="608013" lvl="1" indent="-342900">
@@ -6888,11 +6887,7 @@
             </a:pPr>
             <a:r>
               <a:rPr lang="en-GB" b="1" dirty="0" smtClean="0"/>
-              <a:t>Modules / Controllers / </a:t>
-            </a:r>
-            <a:r>
-              <a:rPr lang="en-GB" b="1" dirty="0" smtClean="0"/>
-              <a:t>Services</a:t>
+              <a:t>Modules / Controllers / Services</a:t>
             </a:r>
             <a:r>
               <a:rPr lang="sr-Latn-RS" b="1" dirty="0" smtClean="0"/>
@@ -6952,11 +6947,7 @@
             </a:pPr>
             <a:r>
               <a:rPr lang="en-GB" i="1" dirty="0" smtClean="0"/>
-              <a:t>ng-show</a:t>
-            </a:r>
-            <a:r>
-              <a:rPr lang="en-GB" i="1" dirty="0" smtClean="0"/>
-              <a:t>, ng-repeat, ng-click, ng-</a:t>
+              <a:t>ng-show, ng-repeat, ng-click, ng-</a:t>
             </a:r>
             <a:r>
               <a:rPr lang="en-GB" i="1" dirty="0" err="1" smtClean="0"/>
@@ -7978,52 +7969,34 @@
           </a:p>
           <a:p>
             <a:r>
-              <a:rPr lang="en-GB" dirty="0" smtClean="0"/>
+              <a:rPr lang="en-GB" smtClean="0"/>
               <a:t>- </a:t>
             </a:r>
             <a:r>
-              <a:rPr lang="en-GB" dirty="0" smtClean="0"/>
-              <a:t>link </a:t>
-            </a:r>
-            <a:r>
-              <a:rPr lang="en-GB" dirty="0" err="1" smtClean="0"/>
-              <a:t>ka</a:t>
-            </a:r>
-            <a:r>
-              <a:rPr lang="en-GB" dirty="0" smtClean="0"/>
+              <a:rPr lang="en-GB"/>
+              <a:t>GitHub: </a:t>
+            </a:r>
+            <a:r>
+              <a:rPr lang="en-GB">
+                <a:hlinkClick r:id="rId4"/>
+              </a:rPr>
+              <a:t>https</a:t>
+            </a:r>
+            <a:r>
+              <a:rPr lang="en-GB">
+                <a:hlinkClick r:id="rId4"/>
+              </a:rPr>
+              <a:t>://</a:t>
+            </a:r>
+            <a:r>
+              <a:rPr lang="en-GB" smtClean="0">
+                <a:hlinkClick r:id="rId4"/>
+              </a:rPr>
+              <a:t>github.com/Zuehlke/ZRS-Angular-Workshop</a:t>
+            </a:r>
+            <a:r>
+              <a:rPr lang="en-GB" smtClean="0"/>
               <a:t> </a:t>
-            </a:r>
-            <a:r>
-              <a:rPr lang="en-GB" dirty="0" err="1" smtClean="0"/>
-              <a:t>nasem</a:t>
-            </a:r>
-            <a:r>
-              <a:rPr lang="en-GB" dirty="0" smtClean="0"/>
-              <a:t> </a:t>
-            </a:r>
-            <a:r>
-              <a:rPr lang="en-GB" dirty="0" err="1" smtClean="0"/>
-              <a:t>zuhlke</a:t>
-            </a:r>
-            <a:r>
-              <a:rPr lang="en-GB" dirty="0" smtClean="0"/>
-              <a:t> repo </a:t>
-            </a:r>
-            <a:r>
-              <a:rPr lang="en-GB" dirty="0" err="1" smtClean="0"/>
-              <a:t>sa</a:t>
-            </a:r>
-            <a:r>
-              <a:rPr lang="en-GB" dirty="0" smtClean="0"/>
-              <a:t> </a:t>
-            </a:r>
-            <a:r>
-              <a:rPr lang="en-GB" dirty="0" err="1" smtClean="0"/>
-              <a:t>kodom</a:t>
-            </a:r>
-            <a:r>
-              <a:rPr lang="en-GB" dirty="0" smtClean="0"/>
-              <a:t>?</a:t>
             </a:r>
             <a:endParaRPr lang="en-GB" dirty="0" smtClean="0"/>
           </a:p>
@@ -8090,7 +8063,7 @@
           <p:nvPr/>
         </p:nvPicPr>
         <p:blipFill>
-          <a:blip r:embed="rId4"/>
+          <a:blip r:embed="rId5"/>
           <a:stretch>
             <a:fillRect/>
           </a:stretch>

</xml_diff>